<commit_message>
several pretty pictures :)
</commit_message>
<xml_diff>
--- a/notes/images.pptx
+++ b/notes/images.pptx
@@ -5,12 +5,13 @@
     <p:sldMasterId id="2147483659" r:id="rId1"/>
   </p:sldMasterIdLst>
   <p:notesMasterIdLst>
-    <p:notesMasterId r:id="rId5"/>
+    <p:notesMasterId r:id="rId6"/>
   </p:notesMasterIdLst>
   <p:sldIdLst>
     <p:sldId id="257" r:id="rId2"/>
     <p:sldId id="258" r:id="rId3"/>
     <p:sldId id="259" r:id="rId4"/>
+    <p:sldId id="260" r:id="rId5"/>
   </p:sldIdLst>
   <p:sldSz cx="9144000" cy="5143500" type="screen16x9"/>
   <p:notesSz cx="6858000" cy="9144000"/>
@@ -5741,8 +5742,8 @@
           </a:p>
         </p:txBody>
       </p:sp>
-      <mc:AlternateContent xmlns:mc="http://schemas.openxmlformats.org/markup-compatibility/2006">
-        <mc:Choice xmlns:a14="http://schemas.microsoft.com/office/drawing/2010/main" Requires="a14">
+      <mc:AlternateContent xmlns:mc="http://schemas.openxmlformats.org/markup-compatibility/2006" xmlns:a14="http://schemas.microsoft.com/office/drawing/2010/main">
+        <mc:Choice Requires="a14">
           <p:sp>
             <p:nvSpPr>
               <p:cNvPr id="36" name="TextBox 35">
@@ -5771,6 +5772,7 @@
               </a:bodyPr>
               <a:lstStyle/>
               <a:p>
+                <a:pPr/>
                 <a14:m>
                   <m:oMathPara xmlns:m="http://schemas.openxmlformats.org/officeDocument/2006/math">
                     <m:oMathParaPr>
@@ -5816,7 +5818,7 @@
             </p:txBody>
           </p:sp>
         </mc:Choice>
-        <mc:Fallback>
+        <mc:Fallback xmlns="">
           <p:sp>
             <p:nvSpPr>
               <p:cNvPr id="36" name="TextBox 35">
@@ -5950,8 +5952,8 @@
           </a:fontRef>
         </p:style>
       </p:cxnSp>
-      <mc:AlternateContent xmlns:mc="http://schemas.openxmlformats.org/markup-compatibility/2006">
-        <mc:Choice xmlns:a14="http://schemas.microsoft.com/office/drawing/2010/main" Requires="a14">
+      <mc:AlternateContent xmlns:mc="http://schemas.openxmlformats.org/markup-compatibility/2006" xmlns:a14="http://schemas.microsoft.com/office/drawing/2010/main">
+        <mc:Choice Requires="a14">
           <p:sp>
             <p:nvSpPr>
               <p:cNvPr id="58" name="TextBox 57">
@@ -5980,6 +5982,7 @@
               </a:bodyPr>
               <a:lstStyle/>
               <a:p>
+                <a:pPr/>
                 <a14:m>
                   <m:oMathPara xmlns:m="http://schemas.openxmlformats.org/officeDocument/2006/math">
                     <m:oMathParaPr>
@@ -6025,7 +6028,7 @@
             </p:txBody>
           </p:sp>
         </mc:Choice>
-        <mc:Fallback>
+        <mc:Fallback xmlns="">
           <p:sp>
             <p:nvSpPr>
               <p:cNvPr id="58" name="TextBox 57">
@@ -6113,8 +6116,8 @@
           </a:fontRef>
         </p:style>
       </p:cxnSp>
-      <mc:AlternateContent xmlns:mc="http://schemas.openxmlformats.org/markup-compatibility/2006">
-        <mc:Choice xmlns:a14="http://schemas.microsoft.com/office/drawing/2010/main" Requires="a14">
+      <mc:AlternateContent xmlns:mc="http://schemas.openxmlformats.org/markup-compatibility/2006" xmlns:a14="http://schemas.microsoft.com/office/drawing/2010/main">
+        <mc:Choice Requires="a14">
           <p:sp>
             <p:nvSpPr>
               <p:cNvPr id="60" name="TextBox 59">
@@ -6143,6 +6146,7 @@
               </a:bodyPr>
               <a:lstStyle/>
               <a:p>
+                <a:pPr/>
                 <a14:m>
                   <m:oMathPara xmlns:m="http://schemas.openxmlformats.org/officeDocument/2006/math">
                     <m:oMathParaPr>
@@ -6195,7 +6199,7 @@
             </p:txBody>
           </p:sp>
         </mc:Choice>
-        <mc:Fallback>
+        <mc:Fallback xmlns="">
           <p:sp>
             <p:nvSpPr>
               <p:cNvPr id="60" name="TextBox 59">
@@ -6283,8 +6287,8 @@
           </a:fontRef>
         </p:style>
       </p:cxnSp>
-      <mc:AlternateContent xmlns:mc="http://schemas.openxmlformats.org/markup-compatibility/2006">
-        <mc:Choice xmlns:a14="http://schemas.microsoft.com/office/drawing/2010/main" Requires="a14">
+      <mc:AlternateContent xmlns:mc="http://schemas.openxmlformats.org/markup-compatibility/2006" xmlns:a14="http://schemas.microsoft.com/office/drawing/2010/main">
+        <mc:Choice Requires="a14">
           <p:sp>
             <p:nvSpPr>
               <p:cNvPr id="62" name="TextBox 61">
@@ -6313,6 +6317,7 @@
               </a:bodyPr>
               <a:lstStyle/>
               <a:p>
+                <a:pPr/>
                 <a14:m>
                   <m:oMathPara xmlns:m="http://schemas.openxmlformats.org/officeDocument/2006/math">
                     <m:oMathParaPr>
@@ -6402,7 +6407,7 @@
             </p:txBody>
           </p:sp>
         </mc:Choice>
-        <mc:Fallback>
+        <mc:Fallback xmlns="">
           <p:sp>
             <p:nvSpPr>
               <p:cNvPr id="62" name="TextBox 61">
@@ -6491,8 +6496,8 @@
           </a:fontRef>
         </p:style>
       </p:cxnSp>
-      <mc:AlternateContent xmlns:mc="http://schemas.openxmlformats.org/markup-compatibility/2006">
-        <mc:Choice xmlns:a14="http://schemas.microsoft.com/office/drawing/2010/main" Requires="a14">
+      <mc:AlternateContent xmlns:mc="http://schemas.openxmlformats.org/markup-compatibility/2006" xmlns:a14="http://schemas.microsoft.com/office/drawing/2010/main">
+        <mc:Choice Requires="a14">
           <p:sp>
             <p:nvSpPr>
               <p:cNvPr id="74" name="TextBox 73">
@@ -6521,6 +6526,7 @@
               </a:bodyPr>
               <a:lstStyle/>
               <a:p>
+                <a:pPr/>
                 <a14:m>
                   <m:oMathPara xmlns:m="http://schemas.openxmlformats.org/officeDocument/2006/math">
                     <m:oMathParaPr>
@@ -6700,7 +6706,7 @@
             </p:txBody>
           </p:sp>
         </mc:Choice>
-        <mc:Fallback>
+        <mc:Fallback xmlns="">
           <p:sp>
             <p:nvSpPr>
               <p:cNvPr id="74" name="TextBox 73">
@@ -7053,8 +7059,8 @@
           </a:p>
         </p:txBody>
       </p:sp>
-      <mc:AlternateContent xmlns:mc="http://schemas.openxmlformats.org/markup-compatibility/2006">
-        <mc:Choice xmlns:a14="http://schemas.microsoft.com/office/drawing/2010/main" Requires="a14">
+      <mc:AlternateContent xmlns:mc="http://schemas.openxmlformats.org/markup-compatibility/2006" xmlns:a14="http://schemas.microsoft.com/office/drawing/2010/main">
+        <mc:Choice Requires="a14">
           <p:sp>
             <p:nvSpPr>
               <p:cNvPr id="36" name="TextBox 35">
@@ -7083,6 +7089,7 @@
               </a:bodyPr>
               <a:lstStyle/>
               <a:p>
+                <a:pPr/>
                 <a14:m>
                   <m:oMathPara xmlns:m="http://schemas.openxmlformats.org/officeDocument/2006/math">
                     <m:oMathParaPr>
@@ -7128,7 +7135,7 @@
             </p:txBody>
           </p:sp>
         </mc:Choice>
-        <mc:Fallback>
+        <mc:Fallback xmlns="">
           <p:sp>
             <p:nvSpPr>
               <p:cNvPr id="36" name="TextBox 35">
@@ -7621,8 +7628,8 @@
           </a:fontRef>
         </p:style>
       </p:cxnSp>
-      <mc:AlternateContent xmlns:mc="http://schemas.openxmlformats.org/markup-compatibility/2006">
-        <mc:Choice xmlns:a14="http://schemas.microsoft.com/office/drawing/2010/main" Requires="a14">
+      <mc:AlternateContent xmlns:mc="http://schemas.openxmlformats.org/markup-compatibility/2006" xmlns:a14="http://schemas.microsoft.com/office/drawing/2010/main">
+        <mc:Choice Requires="a14">
           <p:sp>
             <p:nvSpPr>
               <p:cNvPr id="66" name="TextBox 65">
@@ -7723,7 +7730,7 @@
             </p:txBody>
           </p:sp>
         </mc:Choice>
-        <mc:Fallback>
+        <mc:Fallback xmlns="">
           <p:sp>
             <p:nvSpPr>
               <p:cNvPr id="66" name="TextBox 65">
@@ -8062,8 +8069,8 @@
           </a:p>
         </p:txBody>
       </p:sp>
-      <mc:AlternateContent xmlns:mc="http://schemas.openxmlformats.org/markup-compatibility/2006">
-        <mc:Choice xmlns:a14="http://schemas.microsoft.com/office/drawing/2010/main" Requires="a14">
+      <mc:AlternateContent xmlns:mc="http://schemas.openxmlformats.org/markup-compatibility/2006" xmlns:a14="http://schemas.microsoft.com/office/drawing/2010/main">
+        <mc:Choice Requires="a14">
           <p:sp>
             <p:nvSpPr>
               <p:cNvPr id="7" name="TextBox 6">
@@ -8092,6 +8099,7 @@
               </a:bodyPr>
               <a:lstStyle/>
               <a:p>
+                <a:pPr/>
                 <a14:m>
                   <m:oMathPara xmlns:m="http://schemas.openxmlformats.org/officeDocument/2006/math">
                     <m:oMathParaPr>
@@ -8113,7 +8121,7 @@
             </p:txBody>
           </p:sp>
         </mc:Choice>
-        <mc:Fallback>
+        <mc:Fallback xmlns="">
           <p:sp>
             <p:nvSpPr>
               <p:cNvPr id="7" name="TextBox 6">
@@ -8667,8 +8675,8 @@
           </a:p>
         </p:txBody>
       </p:sp>
-      <mc:AlternateContent xmlns:mc="http://schemas.openxmlformats.org/markup-compatibility/2006">
-        <mc:Choice xmlns:a14="http://schemas.microsoft.com/office/drawing/2010/main" Requires="a14">
+      <mc:AlternateContent xmlns:mc="http://schemas.openxmlformats.org/markup-compatibility/2006" xmlns:a14="http://schemas.microsoft.com/office/drawing/2010/main">
+        <mc:Choice Requires="a14">
           <p:sp>
             <p:nvSpPr>
               <p:cNvPr id="40" name="TextBox 39">
@@ -8697,6 +8705,7 @@
               </a:bodyPr>
               <a:lstStyle/>
               <a:p>
+                <a:pPr/>
                 <a14:m>
                   <m:oMathPara xmlns:m="http://schemas.openxmlformats.org/officeDocument/2006/math">
                     <m:oMathParaPr>
@@ -8718,7 +8727,7 @@
             </p:txBody>
           </p:sp>
         </mc:Choice>
-        <mc:Fallback>
+        <mc:Fallback xmlns="">
           <p:sp>
             <p:nvSpPr>
               <p:cNvPr id="40" name="TextBox 39">
@@ -9124,8 +9133,8 @@
           </a:p>
         </p:txBody>
       </p:sp>
-      <mc:AlternateContent xmlns:mc="http://schemas.openxmlformats.org/markup-compatibility/2006">
-        <mc:Choice xmlns:a14="http://schemas.microsoft.com/office/drawing/2010/main" Requires="a14">
+      <mc:AlternateContent xmlns:mc="http://schemas.openxmlformats.org/markup-compatibility/2006" xmlns:a14="http://schemas.microsoft.com/office/drawing/2010/main">
+        <mc:Choice Requires="a14">
           <p:sp>
             <p:nvSpPr>
               <p:cNvPr id="49" name="TextBox 48">
@@ -9154,6 +9163,7 @@
               </a:bodyPr>
               <a:lstStyle/>
               <a:p>
+                <a:pPr/>
                 <a14:m>
                   <m:oMathPara xmlns:m="http://schemas.openxmlformats.org/officeDocument/2006/math">
                     <m:oMathParaPr>
@@ -9175,7 +9185,7 @@
             </p:txBody>
           </p:sp>
         </mc:Choice>
-        <mc:Fallback>
+        <mc:Fallback xmlns="">
           <p:sp>
             <p:nvSpPr>
               <p:cNvPr id="49" name="TextBox 48">
@@ -9809,6 +9819,2025 @@
     <p:extLst>
       <p:ext uri="{BB962C8B-B14F-4D97-AF65-F5344CB8AC3E}">
         <p14:creationId xmlns:p14="http://schemas.microsoft.com/office/powerpoint/2010/main" val="1520601633"/>
+      </p:ext>
+    </p:extLst>
+  </p:cSld>
+  <p:clrMapOvr>
+    <a:masterClrMapping/>
+  </p:clrMapOvr>
+</p:sld>
+</file>
+
+<file path=ppt/slides/slide4.xml><?xml version="1.0" encoding="utf-8"?>
+<p:sld xmlns:a="http://schemas.openxmlformats.org/drawingml/2006/main" xmlns:r="http://schemas.openxmlformats.org/officeDocument/2006/relationships" xmlns:p="http://schemas.openxmlformats.org/presentationml/2006/main">
+  <p:cSld>
+    <p:spTree>
+      <p:nvGrpSpPr>
+        <p:cNvPr id="1" name="">
+          <a:extLst>
+            <a:ext uri="{FF2B5EF4-FFF2-40B4-BE49-F238E27FC236}">
+              <a16:creationId xmlns:a16="http://schemas.microsoft.com/office/drawing/2014/main" id="{175BA674-ED48-2D74-EE17-B547D0E1E144}"/>
+            </a:ext>
+          </a:extLst>
+        </p:cNvPr>
+        <p:cNvGrpSpPr/>
+        <p:nvPr/>
+      </p:nvGrpSpPr>
+      <p:grpSpPr>
+        <a:xfrm>
+          <a:off x="0" y="0"/>
+          <a:ext cx="0" cy="0"/>
+          <a:chOff x="0" y="0"/>
+          <a:chExt cx="0" cy="0"/>
+        </a:xfrm>
+      </p:grpSpPr>
+      <p:sp>
+        <p:nvSpPr>
+          <p:cNvPr id="72" name="Oval 71">
+            <a:extLst>
+              <a:ext uri="{FF2B5EF4-FFF2-40B4-BE49-F238E27FC236}">
+                <a16:creationId xmlns:a16="http://schemas.microsoft.com/office/drawing/2014/main" id="{96A814EC-8118-7E32-6B44-8F714087E638}"/>
+              </a:ext>
+            </a:extLst>
+          </p:cNvPr>
+          <p:cNvSpPr/>
+          <p:nvPr/>
+        </p:nvSpPr>
+        <p:spPr>
+          <a:xfrm>
+            <a:off x="5041548" y="3249740"/>
+            <a:ext cx="212317" cy="613636"/>
+          </a:xfrm>
+          <a:prstGeom prst="ellipse">
+            <a:avLst/>
+          </a:prstGeom>
+          <a:solidFill>
+            <a:schemeClr val="accent1">
+              <a:lumMod val="40000"/>
+              <a:lumOff val="60000"/>
+            </a:schemeClr>
+          </a:solidFill>
+          <a:ln>
+            <a:noFill/>
+          </a:ln>
+        </p:spPr>
+        <p:style>
+          <a:lnRef idx="2">
+            <a:schemeClr val="accent1">
+              <a:shade val="15000"/>
+            </a:schemeClr>
+          </a:lnRef>
+          <a:fillRef idx="1">
+            <a:schemeClr val="accent1"/>
+          </a:fillRef>
+          <a:effectRef idx="0">
+            <a:schemeClr val="accent1"/>
+          </a:effectRef>
+          <a:fontRef idx="minor">
+            <a:schemeClr val="lt1"/>
+          </a:fontRef>
+        </p:style>
+        <p:txBody>
+          <a:bodyPr rtlCol="0" anchor="ctr"/>
+          <a:lstStyle/>
+          <a:p>
+            <a:pPr algn="ctr"/>
+            <a:endParaRPr lang="en-US"/>
+          </a:p>
+        </p:txBody>
+      </p:sp>
+      <p:sp>
+        <p:nvSpPr>
+          <p:cNvPr id="55" name="Oval 54">
+            <a:extLst>
+              <a:ext uri="{FF2B5EF4-FFF2-40B4-BE49-F238E27FC236}">
+                <a16:creationId xmlns:a16="http://schemas.microsoft.com/office/drawing/2014/main" id="{67652264-3A42-E64C-B937-A91A545E7610}"/>
+              </a:ext>
+            </a:extLst>
+          </p:cNvPr>
+          <p:cNvSpPr/>
+          <p:nvPr/>
+        </p:nvSpPr>
+        <p:spPr>
+          <a:xfrm>
+            <a:off x="1634521" y="3044650"/>
+            <a:ext cx="1017466" cy="1017466"/>
+          </a:xfrm>
+          <a:prstGeom prst="ellipse">
+            <a:avLst/>
+          </a:prstGeom>
+          <a:solidFill>
+            <a:schemeClr val="accent1">
+              <a:lumMod val="40000"/>
+              <a:lumOff val="60000"/>
+            </a:schemeClr>
+          </a:solidFill>
+          <a:ln>
+            <a:noFill/>
+          </a:ln>
+        </p:spPr>
+        <p:style>
+          <a:lnRef idx="2">
+            <a:schemeClr val="accent1">
+              <a:shade val="15000"/>
+            </a:schemeClr>
+          </a:lnRef>
+          <a:fillRef idx="1">
+            <a:schemeClr val="accent1"/>
+          </a:fillRef>
+          <a:effectRef idx="0">
+            <a:schemeClr val="accent1"/>
+          </a:effectRef>
+          <a:fontRef idx="minor">
+            <a:schemeClr val="lt1"/>
+          </a:fontRef>
+        </p:style>
+        <p:txBody>
+          <a:bodyPr rtlCol="0" anchor="ctr"/>
+          <a:lstStyle/>
+          <a:p>
+            <a:pPr algn="ctr"/>
+            <a:endParaRPr lang="en-US"/>
+          </a:p>
+        </p:txBody>
+      </p:sp>
+      <p:sp>
+        <p:nvSpPr>
+          <p:cNvPr id="56" name="Oval 55">
+            <a:extLst>
+              <a:ext uri="{FF2B5EF4-FFF2-40B4-BE49-F238E27FC236}">
+                <a16:creationId xmlns:a16="http://schemas.microsoft.com/office/drawing/2014/main" id="{12FF8C63-2302-A5C2-9191-CC163906F118}"/>
+              </a:ext>
+            </a:extLst>
+          </p:cNvPr>
+          <p:cNvSpPr/>
+          <p:nvPr/>
+        </p:nvSpPr>
+        <p:spPr>
+          <a:xfrm>
+            <a:off x="2422343" y="3044650"/>
+            <a:ext cx="1017466" cy="1017466"/>
+          </a:xfrm>
+          <a:prstGeom prst="ellipse">
+            <a:avLst/>
+          </a:prstGeom>
+          <a:solidFill>
+            <a:schemeClr val="accent1">
+              <a:lumMod val="40000"/>
+              <a:lumOff val="60000"/>
+            </a:schemeClr>
+          </a:solidFill>
+          <a:ln>
+            <a:noFill/>
+          </a:ln>
+        </p:spPr>
+        <p:style>
+          <a:lnRef idx="2">
+            <a:schemeClr val="accent1">
+              <a:shade val="15000"/>
+            </a:schemeClr>
+          </a:lnRef>
+          <a:fillRef idx="1">
+            <a:schemeClr val="accent1"/>
+          </a:fillRef>
+          <a:effectRef idx="0">
+            <a:schemeClr val="accent1"/>
+          </a:effectRef>
+          <a:fontRef idx="minor">
+            <a:schemeClr val="lt1"/>
+          </a:fontRef>
+        </p:style>
+        <p:txBody>
+          <a:bodyPr rtlCol="0" anchor="ctr"/>
+          <a:lstStyle/>
+          <a:p>
+            <a:pPr algn="ctr"/>
+            <a:endParaRPr lang="en-US"/>
+          </a:p>
+        </p:txBody>
+      </p:sp>
+      <p:sp>
+        <p:nvSpPr>
+          <p:cNvPr id="5" name="Rectangle 4">
+            <a:extLst>
+              <a:ext uri="{FF2B5EF4-FFF2-40B4-BE49-F238E27FC236}">
+                <a16:creationId xmlns:a16="http://schemas.microsoft.com/office/drawing/2014/main" id="{74AA627B-2956-18ED-81A9-B783D2AE6308}"/>
+              </a:ext>
+            </a:extLst>
+          </p:cNvPr>
+          <p:cNvSpPr/>
+          <p:nvPr/>
+        </p:nvSpPr>
+        <p:spPr>
+          <a:xfrm>
+            <a:off x="1422286" y="1163256"/>
+            <a:ext cx="2281033" cy="1241616"/>
+          </a:xfrm>
+          <a:prstGeom prst="rect">
+            <a:avLst/>
+          </a:prstGeom>
+          <a:noFill/>
+          <a:ln>
+            <a:solidFill>
+              <a:schemeClr val="tx1"/>
+            </a:solidFill>
+          </a:ln>
+        </p:spPr>
+        <p:style>
+          <a:lnRef idx="2">
+            <a:schemeClr val="accent1">
+              <a:shade val="15000"/>
+            </a:schemeClr>
+          </a:lnRef>
+          <a:fillRef idx="1">
+            <a:schemeClr val="accent1"/>
+          </a:fillRef>
+          <a:effectRef idx="0">
+            <a:schemeClr val="accent1"/>
+          </a:effectRef>
+          <a:fontRef idx="minor">
+            <a:schemeClr val="lt1"/>
+          </a:fontRef>
+        </p:style>
+        <p:txBody>
+          <a:bodyPr rtlCol="0" anchor="ctr"/>
+          <a:lstStyle/>
+          <a:p>
+            <a:pPr algn="ctr"/>
+            <a:endParaRPr lang="en-US"/>
+          </a:p>
+        </p:txBody>
+      </p:sp>
+      <p:sp>
+        <p:nvSpPr>
+          <p:cNvPr id="8" name="Oval 7">
+            <a:extLst>
+              <a:ext uri="{FF2B5EF4-FFF2-40B4-BE49-F238E27FC236}">
+                <a16:creationId xmlns:a16="http://schemas.microsoft.com/office/drawing/2014/main" id="{A31C22F9-0344-C124-D9FF-3FF3E0744590}"/>
+              </a:ext>
+            </a:extLst>
+          </p:cNvPr>
+          <p:cNvSpPr/>
+          <p:nvPr/>
+        </p:nvSpPr>
+        <p:spPr>
+          <a:xfrm>
+            <a:off x="1637230" y="1302717"/>
+            <a:ext cx="1017466" cy="1017466"/>
+          </a:xfrm>
+          <a:prstGeom prst="ellipse">
+            <a:avLst/>
+          </a:prstGeom>
+          <a:noFill/>
+          <a:ln>
+            <a:solidFill>
+              <a:schemeClr val="tx1"/>
+            </a:solidFill>
+          </a:ln>
+        </p:spPr>
+        <p:style>
+          <a:lnRef idx="2">
+            <a:schemeClr val="accent1">
+              <a:shade val="15000"/>
+            </a:schemeClr>
+          </a:lnRef>
+          <a:fillRef idx="1">
+            <a:schemeClr val="accent1"/>
+          </a:fillRef>
+          <a:effectRef idx="0">
+            <a:schemeClr val="accent1"/>
+          </a:effectRef>
+          <a:fontRef idx="minor">
+            <a:schemeClr val="lt1"/>
+          </a:fontRef>
+        </p:style>
+        <p:txBody>
+          <a:bodyPr rtlCol="0" anchor="ctr"/>
+          <a:lstStyle/>
+          <a:p>
+            <a:pPr algn="ctr"/>
+            <a:endParaRPr lang="en-US"/>
+          </a:p>
+        </p:txBody>
+      </p:sp>
+      <p:sp>
+        <p:nvSpPr>
+          <p:cNvPr id="9" name="Oval 8">
+            <a:extLst>
+              <a:ext uri="{FF2B5EF4-FFF2-40B4-BE49-F238E27FC236}">
+                <a16:creationId xmlns:a16="http://schemas.microsoft.com/office/drawing/2014/main" id="{D813B64D-39C3-9D86-849B-0090104DA29C}"/>
+              </a:ext>
+            </a:extLst>
+          </p:cNvPr>
+          <p:cNvSpPr/>
+          <p:nvPr/>
+        </p:nvSpPr>
+        <p:spPr>
+          <a:xfrm>
+            <a:off x="2425052" y="1302717"/>
+            <a:ext cx="1017466" cy="1017466"/>
+          </a:xfrm>
+          <a:prstGeom prst="ellipse">
+            <a:avLst/>
+          </a:prstGeom>
+          <a:noFill/>
+          <a:ln>
+            <a:solidFill>
+              <a:schemeClr val="tx1"/>
+            </a:solidFill>
+          </a:ln>
+        </p:spPr>
+        <p:style>
+          <a:lnRef idx="2">
+            <a:schemeClr val="accent1">
+              <a:shade val="15000"/>
+            </a:schemeClr>
+          </a:lnRef>
+          <a:fillRef idx="1">
+            <a:schemeClr val="accent1"/>
+          </a:fillRef>
+          <a:effectRef idx="0">
+            <a:schemeClr val="accent1"/>
+          </a:effectRef>
+          <a:fontRef idx="minor">
+            <a:schemeClr val="lt1"/>
+          </a:fontRef>
+        </p:style>
+        <p:txBody>
+          <a:bodyPr rtlCol="0" anchor="ctr"/>
+          <a:lstStyle/>
+          <a:p>
+            <a:pPr algn="ctr"/>
+            <a:endParaRPr lang="en-US"/>
+          </a:p>
+        </p:txBody>
+      </p:sp>
+      <mc:AlternateContent xmlns:mc="http://schemas.openxmlformats.org/markup-compatibility/2006">
+        <mc:Choice xmlns:a14="http://schemas.microsoft.com/office/drawing/2010/main" Requires="a14">
+          <p:sp>
+            <p:nvSpPr>
+              <p:cNvPr id="13" name="TextBox 12">
+                <a:extLst>
+                  <a:ext uri="{FF2B5EF4-FFF2-40B4-BE49-F238E27FC236}">
+                    <a16:creationId xmlns:a16="http://schemas.microsoft.com/office/drawing/2014/main" id="{65F681D5-4AD3-9606-9E5C-A47C8BE78D6F}"/>
+                  </a:ext>
+                </a:extLst>
+              </p:cNvPr>
+              <p:cNvSpPr txBox="1"/>
+              <p:nvPr/>
+            </p:nvSpPr>
+            <p:spPr>
+              <a:xfrm>
+                <a:off x="1961716" y="1292847"/>
+                <a:ext cx="340286" cy="307777"/>
+              </a:xfrm>
+              <a:prstGeom prst="rect">
+                <a:avLst/>
+              </a:prstGeom>
+              <a:noFill/>
+            </p:spPr>
+            <p:txBody>
+              <a:bodyPr wrap="none" rtlCol="0">
+                <a:spAutoFit/>
+              </a:bodyPr>
+              <a:lstStyle/>
+              <a:p>
+                <a14:m>
+                  <m:oMathPara xmlns:m="http://schemas.openxmlformats.org/officeDocument/2006/math">
+                    <m:oMathParaPr>
+                      <m:jc m:val="centerGroup"/>
+                    </m:oMathParaPr>
+                    <m:oMath xmlns:m="http://schemas.openxmlformats.org/officeDocument/2006/math">
+                      <m:r>
+                        <a:rPr lang="en-US" b="0" i="1" smtClean="0">
+                          <a:latin typeface="Cambria Math" panose="02040503050406030204" pitchFamily="18" charset="0"/>
+                          <a:cs typeface="Calibri" panose="020F0502020204030204" pitchFamily="34" charset="0"/>
+                        </a:rPr>
+                        <m:t>𝐴</m:t>
+                      </m:r>
+                    </m:oMath>
+                  </m:oMathPara>
+                </a14:m>
+                <a:endParaRPr lang="en-US" dirty="0">
+                  <a:latin typeface="Calibri" panose="020F0502020204030204" pitchFamily="34" charset="0"/>
+                  <a:cs typeface="Calibri" panose="020F0502020204030204" pitchFamily="34" charset="0"/>
+                </a:endParaRPr>
+              </a:p>
+            </p:txBody>
+          </p:sp>
+        </mc:Choice>
+        <mc:Fallback>
+          <p:sp>
+            <p:nvSpPr>
+              <p:cNvPr id="13" name="TextBox 12">
+                <a:extLst>
+                  <a:ext uri="{FF2B5EF4-FFF2-40B4-BE49-F238E27FC236}">
+                    <a16:creationId xmlns:a16="http://schemas.microsoft.com/office/drawing/2014/main" id="{65F681D5-4AD3-9606-9E5C-A47C8BE78D6F}"/>
+                  </a:ext>
+                </a:extLst>
+              </p:cNvPr>
+              <p:cNvSpPr txBox="1">
+                <a:spLocks noRot="1" noChangeAspect="1" noMove="1" noResize="1" noEditPoints="1" noAdjustHandles="1" noChangeArrowheads="1" noChangeShapeType="1" noTextEdit="1"/>
+              </p:cNvSpPr>
+              <p:nvPr/>
+            </p:nvSpPr>
+            <p:spPr>
+              <a:xfrm>
+                <a:off x="1961716" y="1292847"/>
+                <a:ext cx="340286" cy="307777"/>
+              </a:xfrm>
+              <a:prstGeom prst="rect">
+                <a:avLst/>
+              </a:prstGeom>
+              <a:blipFill>
+                <a:blip r:embed="rId2"/>
+                <a:stretch>
+                  <a:fillRect/>
+                </a:stretch>
+              </a:blipFill>
+            </p:spPr>
+            <p:txBody>
+              <a:bodyPr/>
+              <a:lstStyle/>
+              <a:p>
+                <a:r>
+                  <a:rPr lang="en-US">
+                    <a:noFill/>
+                  </a:rPr>
+                  <a:t> </a:t>
+                </a:r>
+              </a:p>
+            </p:txBody>
+          </p:sp>
+        </mc:Fallback>
+      </mc:AlternateContent>
+      <mc:AlternateContent xmlns:mc="http://schemas.openxmlformats.org/markup-compatibility/2006">
+        <mc:Choice xmlns:a14="http://schemas.microsoft.com/office/drawing/2010/main" Requires="a14">
+          <p:sp>
+            <p:nvSpPr>
+              <p:cNvPr id="14" name="TextBox 13">
+                <a:extLst>
+                  <a:ext uri="{FF2B5EF4-FFF2-40B4-BE49-F238E27FC236}">
+                    <a16:creationId xmlns:a16="http://schemas.microsoft.com/office/drawing/2014/main" id="{EE7353DB-3D4D-525F-9B78-92C27301A96E}"/>
+                  </a:ext>
+                </a:extLst>
+              </p:cNvPr>
+              <p:cNvSpPr txBox="1"/>
+              <p:nvPr/>
+            </p:nvSpPr>
+            <p:spPr>
+              <a:xfrm>
+                <a:off x="2749538" y="1302717"/>
+                <a:ext cx="348172" cy="307777"/>
+              </a:xfrm>
+              <a:prstGeom prst="rect">
+                <a:avLst/>
+              </a:prstGeom>
+              <a:noFill/>
+            </p:spPr>
+            <p:txBody>
+              <a:bodyPr wrap="none" rtlCol="0">
+                <a:spAutoFit/>
+              </a:bodyPr>
+              <a:lstStyle/>
+              <a:p>
+                <a14:m>
+                  <m:oMathPara xmlns:m="http://schemas.openxmlformats.org/officeDocument/2006/math">
+                    <m:oMathParaPr>
+                      <m:jc m:val="centerGroup"/>
+                    </m:oMathParaPr>
+                    <m:oMath xmlns:m="http://schemas.openxmlformats.org/officeDocument/2006/math">
+                      <m:r>
+                        <a:rPr lang="en-US" b="0" i="1" smtClean="0">
+                          <a:latin typeface="Cambria Math" panose="02040503050406030204" pitchFamily="18" charset="0"/>
+                          <a:cs typeface="Calibri" panose="020F0502020204030204" pitchFamily="34" charset="0"/>
+                        </a:rPr>
+                        <m:t>𝐵</m:t>
+                      </m:r>
+                    </m:oMath>
+                  </m:oMathPara>
+                </a14:m>
+                <a:endParaRPr lang="en-US" dirty="0">
+                  <a:latin typeface="Calibri" panose="020F0502020204030204" pitchFamily="34" charset="0"/>
+                  <a:cs typeface="Calibri" panose="020F0502020204030204" pitchFamily="34" charset="0"/>
+                </a:endParaRPr>
+              </a:p>
+            </p:txBody>
+          </p:sp>
+        </mc:Choice>
+        <mc:Fallback>
+          <p:sp>
+            <p:nvSpPr>
+              <p:cNvPr id="14" name="TextBox 13">
+                <a:extLst>
+                  <a:ext uri="{FF2B5EF4-FFF2-40B4-BE49-F238E27FC236}">
+                    <a16:creationId xmlns:a16="http://schemas.microsoft.com/office/drawing/2014/main" id="{EE7353DB-3D4D-525F-9B78-92C27301A96E}"/>
+                  </a:ext>
+                </a:extLst>
+              </p:cNvPr>
+              <p:cNvSpPr txBox="1">
+                <a:spLocks noRot="1" noChangeAspect="1" noMove="1" noResize="1" noEditPoints="1" noAdjustHandles="1" noChangeArrowheads="1" noChangeShapeType="1" noTextEdit="1"/>
+              </p:cNvSpPr>
+              <p:nvPr/>
+            </p:nvSpPr>
+            <p:spPr>
+              <a:xfrm>
+                <a:off x="2749538" y="1302717"/>
+                <a:ext cx="348172" cy="307777"/>
+              </a:xfrm>
+              <a:prstGeom prst="rect">
+                <a:avLst/>
+              </a:prstGeom>
+              <a:blipFill>
+                <a:blip r:embed="rId3"/>
+                <a:stretch>
+                  <a:fillRect/>
+                </a:stretch>
+              </a:blipFill>
+            </p:spPr>
+            <p:txBody>
+              <a:bodyPr/>
+              <a:lstStyle/>
+              <a:p>
+                <a:r>
+                  <a:rPr lang="en-US">
+                    <a:noFill/>
+                  </a:rPr>
+                  <a:t> </a:t>
+                </a:r>
+              </a:p>
+            </p:txBody>
+          </p:sp>
+        </mc:Fallback>
+      </mc:AlternateContent>
+      <p:sp>
+        <p:nvSpPr>
+          <p:cNvPr id="16" name="Rectangle 15">
+            <a:extLst>
+              <a:ext uri="{FF2B5EF4-FFF2-40B4-BE49-F238E27FC236}">
+                <a16:creationId xmlns:a16="http://schemas.microsoft.com/office/drawing/2014/main" id="{3AB28044-BC6C-10CF-9752-E5B3DC690B17}"/>
+              </a:ext>
+            </a:extLst>
+          </p:cNvPr>
+          <p:cNvSpPr/>
+          <p:nvPr/>
+        </p:nvSpPr>
+        <p:spPr>
+          <a:xfrm>
+            <a:off x="4027805" y="1171674"/>
+            <a:ext cx="2281033" cy="1241616"/>
+          </a:xfrm>
+          <a:prstGeom prst="rect">
+            <a:avLst/>
+          </a:prstGeom>
+          <a:noFill/>
+          <a:ln>
+            <a:solidFill>
+              <a:schemeClr val="tx1"/>
+            </a:solidFill>
+          </a:ln>
+        </p:spPr>
+        <p:style>
+          <a:lnRef idx="2">
+            <a:schemeClr val="accent1">
+              <a:shade val="15000"/>
+            </a:schemeClr>
+          </a:lnRef>
+          <a:fillRef idx="1">
+            <a:schemeClr val="accent1"/>
+          </a:fillRef>
+          <a:effectRef idx="0">
+            <a:schemeClr val="accent1"/>
+          </a:effectRef>
+          <a:fontRef idx="minor">
+            <a:schemeClr val="lt1"/>
+          </a:fontRef>
+        </p:style>
+        <p:txBody>
+          <a:bodyPr rtlCol="0" anchor="ctr"/>
+          <a:lstStyle/>
+          <a:p>
+            <a:pPr algn="ctr"/>
+            <a:endParaRPr lang="en-US"/>
+          </a:p>
+        </p:txBody>
+      </p:sp>
+      <p:sp>
+        <p:nvSpPr>
+          <p:cNvPr id="17" name="Oval 16">
+            <a:extLst>
+              <a:ext uri="{FF2B5EF4-FFF2-40B4-BE49-F238E27FC236}">
+                <a16:creationId xmlns:a16="http://schemas.microsoft.com/office/drawing/2014/main" id="{E4BE469E-FA24-C090-C785-F844E14C817D}"/>
+              </a:ext>
+            </a:extLst>
+          </p:cNvPr>
+          <p:cNvSpPr/>
+          <p:nvPr/>
+        </p:nvSpPr>
+        <p:spPr>
+          <a:xfrm>
+            <a:off x="4242749" y="1311135"/>
+            <a:ext cx="1017466" cy="1017466"/>
+          </a:xfrm>
+          <a:prstGeom prst="ellipse">
+            <a:avLst/>
+          </a:prstGeom>
+          <a:solidFill>
+            <a:schemeClr val="accent1">
+              <a:lumMod val="40000"/>
+              <a:lumOff val="60000"/>
+            </a:schemeClr>
+          </a:solidFill>
+          <a:ln>
+            <a:solidFill>
+              <a:schemeClr val="tx1"/>
+            </a:solidFill>
+          </a:ln>
+        </p:spPr>
+        <p:style>
+          <a:lnRef idx="2">
+            <a:schemeClr val="accent1">
+              <a:shade val="15000"/>
+            </a:schemeClr>
+          </a:lnRef>
+          <a:fillRef idx="1">
+            <a:schemeClr val="accent1"/>
+          </a:fillRef>
+          <a:effectRef idx="0">
+            <a:schemeClr val="accent1"/>
+          </a:effectRef>
+          <a:fontRef idx="minor">
+            <a:schemeClr val="lt1"/>
+          </a:fontRef>
+        </p:style>
+        <p:txBody>
+          <a:bodyPr rtlCol="0" anchor="ctr"/>
+          <a:lstStyle/>
+          <a:p>
+            <a:pPr algn="ctr"/>
+            <a:endParaRPr lang="en-US"/>
+          </a:p>
+        </p:txBody>
+      </p:sp>
+      <p:sp>
+        <p:nvSpPr>
+          <p:cNvPr id="18" name="Oval 17">
+            <a:extLst>
+              <a:ext uri="{FF2B5EF4-FFF2-40B4-BE49-F238E27FC236}">
+                <a16:creationId xmlns:a16="http://schemas.microsoft.com/office/drawing/2014/main" id="{CD5C487E-96ED-3CC5-7422-40BA5C223089}"/>
+              </a:ext>
+            </a:extLst>
+          </p:cNvPr>
+          <p:cNvSpPr/>
+          <p:nvPr/>
+        </p:nvSpPr>
+        <p:spPr>
+          <a:xfrm>
+            <a:off x="5030571" y="1311135"/>
+            <a:ext cx="1017466" cy="1017466"/>
+          </a:xfrm>
+          <a:prstGeom prst="ellipse">
+            <a:avLst/>
+          </a:prstGeom>
+          <a:noFill/>
+          <a:ln>
+            <a:solidFill>
+              <a:schemeClr val="tx1"/>
+            </a:solidFill>
+          </a:ln>
+        </p:spPr>
+        <p:style>
+          <a:lnRef idx="2">
+            <a:schemeClr val="accent1">
+              <a:shade val="15000"/>
+            </a:schemeClr>
+          </a:lnRef>
+          <a:fillRef idx="1">
+            <a:schemeClr val="accent1"/>
+          </a:fillRef>
+          <a:effectRef idx="0">
+            <a:schemeClr val="accent1"/>
+          </a:effectRef>
+          <a:fontRef idx="minor">
+            <a:schemeClr val="lt1"/>
+          </a:fontRef>
+        </p:style>
+        <p:txBody>
+          <a:bodyPr rtlCol="0" anchor="ctr"/>
+          <a:lstStyle/>
+          <a:p>
+            <a:pPr algn="ctr"/>
+            <a:endParaRPr lang="en-US"/>
+          </a:p>
+        </p:txBody>
+      </p:sp>
+      <p:sp>
+        <p:nvSpPr>
+          <p:cNvPr id="25" name="Rectangle 24">
+            <a:extLst>
+              <a:ext uri="{FF2B5EF4-FFF2-40B4-BE49-F238E27FC236}">
+                <a16:creationId xmlns:a16="http://schemas.microsoft.com/office/drawing/2014/main" id="{DCA5A9ED-4E62-07D7-F08C-475D38013D82}"/>
+              </a:ext>
+            </a:extLst>
+          </p:cNvPr>
+          <p:cNvSpPr/>
+          <p:nvPr/>
+        </p:nvSpPr>
+        <p:spPr>
+          <a:xfrm>
+            <a:off x="1422286" y="2896771"/>
+            <a:ext cx="2281033" cy="1241616"/>
+          </a:xfrm>
+          <a:prstGeom prst="rect">
+            <a:avLst/>
+          </a:prstGeom>
+          <a:noFill/>
+          <a:ln>
+            <a:solidFill>
+              <a:schemeClr val="tx1"/>
+            </a:solidFill>
+          </a:ln>
+        </p:spPr>
+        <p:style>
+          <a:lnRef idx="2">
+            <a:schemeClr val="accent1">
+              <a:shade val="15000"/>
+            </a:schemeClr>
+          </a:lnRef>
+          <a:fillRef idx="1">
+            <a:schemeClr val="accent1"/>
+          </a:fillRef>
+          <a:effectRef idx="0">
+            <a:schemeClr val="accent1"/>
+          </a:effectRef>
+          <a:fontRef idx="minor">
+            <a:schemeClr val="lt1"/>
+          </a:fontRef>
+        </p:style>
+        <p:txBody>
+          <a:bodyPr rtlCol="0" anchor="ctr"/>
+          <a:lstStyle/>
+          <a:p>
+            <a:pPr algn="ctr"/>
+            <a:endParaRPr lang="en-US"/>
+          </a:p>
+        </p:txBody>
+      </p:sp>
+      <p:sp>
+        <p:nvSpPr>
+          <p:cNvPr id="26" name="Oval 25">
+            <a:extLst>
+              <a:ext uri="{FF2B5EF4-FFF2-40B4-BE49-F238E27FC236}">
+                <a16:creationId xmlns:a16="http://schemas.microsoft.com/office/drawing/2014/main" id="{E573CC03-898C-8F10-2207-06DEFC2DC3A9}"/>
+              </a:ext>
+            </a:extLst>
+          </p:cNvPr>
+          <p:cNvSpPr/>
+          <p:nvPr/>
+        </p:nvSpPr>
+        <p:spPr>
+          <a:xfrm>
+            <a:off x="1637230" y="3036232"/>
+            <a:ext cx="1017466" cy="1017466"/>
+          </a:xfrm>
+          <a:prstGeom prst="ellipse">
+            <a:avLst/>
+          </a:prstGeom>
+          <a:noFill/>
+          <a:ln>
+            <a:solidFill>
+              <a:schemeClr val="tx1"/>
+            </a:solidFill>
+          </a:ln>
+        </p:spPr>
+        <p:style>
+          <a:lnRef idx="2">
+            <a:schemeClr val="accent1">
+              <a:shade val="15000"/>
+            </a:schemeClr>
+          </a:lnRef>
+          <a:fillRef idx="1">
+            <a:schemeClr val="accent1"/>
+          </a:fillRef>
+          <a:effectRef idx="0">
+            <a:schemeClr val="accent1"/>
+          </a:effectRef>
+          <a:fontRef idx="minor">
+            <a:schemeClr val="lt1"/>
+          </a:fontRef>
+        </p:style>
+        <p:txBody>
+          <a:bodyPr rtlCol="0" anchor="ctr"/>
+          <a:lstStyle/>
+          <a:p>
+            <a:pPr algn="ctr"/>
+            <a:endParaRPr lang="en-US"/>
+          </a:p>
+        </p:txBody>
+      </p:sp>
+      <p:sp>
+        <p:nvSpPr>
+          <p:cNvPr id="27" name="Oval 26">
+            <a:extLst>
+              <a:ext uri="{FF2B5EF4-FFF2-40B4-BE49-F238E27FC236}">
+                <a16:creationId xmlns:a16="http://schemas.microsoft.com/office/drawing/2014/main" id="{3BCC43FC-9CA4-66D5-A1DF-B9002DB4BC2F}"/>
+              </a:ext>
+            </a:extLst>
+          </p:cNvPr>
+          <p:cNvSpPr/>
+          <p:nvPr/>
+        </p:nvSpPr>
+        <p:spPr>
+          <a:xfrm>
+            <a:off x="2425052" y="3036232"/>
+            <a:ext cx="1017466" cy="1017466"/>
+          </a:xfrm>
+          <a:prstGeom prst="ellipse">
+            <a:avLst/>
+          </a:prstGeom>
+          <a:noFill/>
+          <a:ln>
+            <a:solidFill>
+              <a:schemeClr val="tx1"/>
+            </a:solidFill>
+          </a:ln>
+        </p:spPr>
+        <p:style>
+          <a:lnRef idx="2">
+            <a:schemeClr val="accent1">
+              <a:shade val="15000"/>
+            </a:schemeClr>
+          </a:lnRef>
+          <a:fillRef idx="1">
+            <a:schemeClr val="accent1"/>
+          </a:fillRef>
+          <a:effectRef idx="0">
+            <a:schemeClr val="accent1"/>
+          </a:effectRef>
+          <a:fontRef idx="minor">
+            <a:schemeClr val="lt1"/>
+          </a:fontRef>
+        </p:style>
+        <p:txBody>
+          <a:bodyPr rtlCol="0" anchor="ctr"/>
+          <a:lstStyle/>
+          <a:p>
+            <a:pPr algn="ctr"/>
+            <a:endParaRPr lang="en-US"/>
+          </a:p>
+        </p:txBody>
+      </p:sp>
+      <mc:AlternateContent xmlns:mc="http://schemas.openxmlformats.org/markup-compatibility/2006">
+        <mc:Choice xmlns:a14="http://schemas.microsoft.com/office/drawing/2010/main" Requires="a14">
+          <p:sp>
+            <p:nvSpPr>
+              <p:cNvPr id="31" name="TextBox 30">
+                <a:extLst>
+                  <a:ext uri="{FF2B5EF4-FFF2-40B4-BE49-F238E27FC236}">
+                    <a16:creationId xmlns:a16="http://schemas.microsoft.com/office/drawing/2014/main" id="{C3EC19CA-1FB7-AAB5-8F9B-48E2987195E8}"/>
+                  </a:ext>
+                </a:extLst>
+              </p:cNvPr>
+              <p:cNvSpPr txBox="1"/>
+              <p:nvPr/>
+            </p:nvSpPr>
+            <p:spPr>
+              <a:xfrm>
+                <a:off x="1961716" y="3026362"/>
+                <a:ext cx="340286" cy="307777"/>
+              </a:xfrm>
+              <a:prstGeom prst="rect">
+                <a:avLst/>
+              </a:prstGeom>
+              <a:noFill/>
+            </p:spPr>
+            <p:txBody>
+              <a:bodyPr wrap="none" rtlCol="0">
+                <a:spAutoFit/>
+              </a:bodyPr>
+              <a:lstStyle/>
+              <a:p>
+                <a14:m>
+                  <m:oMathPara xmlns:m="http://schemas.openxmlformats.org/officeDocument/2006/math">
+                    <m:oMathParaPr>
+                      <m:jc m:val="centerGroup"/>
+                    </m:oMathParaPr>
+                    <m:oMath xmlns:m="http://schemas.openxmlformats.org/officeDocument/2006/math">
+                      <m:r>
+                        <a:rPr lang="en-US" b="0" i="1" smtClean="0">
+                          <a:latin typeface="Cambria Math" panose="02040503050406030204" pitchFamily="18" charset="0"/>
+                          <a:cs typeface="Calibri" panose="020F0502020204030204" pitchFamily="34" charset="0"/>
+                        </a:rPr>
+                        <m:t>𝐴</m:t>
+                      </m:r>
+                    </m:oMath>
+                  </m:oMathPara>
+                </a14:m>
+                <a:endParaRPr lang="en-US" dirty="0">
+                  <a:latin typeface="Calibri" panose="020F0502020204030204" pitchFamily="34" charset="0"/>
+                  <a:cs typeface="Calibri" panose="020F0502020204030204" pitchFamily="34" charset="0"/>
+                </a:endParaRPr>
+              </a:p>
+            </p:txBody>
+          </p:sp>
+        </mc:Choice>
+        <mc:Fallback>
+          <p:sp>
+            <p:nvSpPr>
+              <p:cNvPr id="31" name="TextBox 30">
+                <a:extLst>
+                  <a:ext uri="{FF2B5EF4-FFF2-40B4-BE49-F238E27FC236}">
+                    <a16:creationId xmlns:a16="http://schemas.microsoft.com/office/drawing/2014/main" id="{C3EC19CA-1FB7-AAB5-8F9B-48E2987195E8}"/>
+                  </a:ext>
+                </a:extLst>
+              </p:cNvPr>
+              <p:cNvSpPr txBox="1">
+                <a:spLocks noRot="1" noChangeAspect="1" noMove="1" noResize="1" noEditPoints="1" noAdjustHandles="1" noChangeArrowheads="1" noChangeShapeType="1" noTextEdit="1"/>
+              </p:cNvSpPr>
+              <p:nvPr/>
+            </p:nvSpPr>
+            <p:spPr>
+              <a:xfrm>
+                <a:off x="1961716" y="3026362"/>
+                <a:ext cx="340286" cy="307777"/>
+              </a:xfrm>
+              <a:prstGeom prst="rect">
+                <a:avLst/>
+              </a:prstGeom>
+              <a:blipFill>
+                <a:blip r:embed="rId4"/>
+                <a:stretch>
+                  <a:fillRect/>
+                </a:stretch>
+              </a:blipFill>
+            </p:spPr>
+            <p:txBody>
+              <a:bodyPr/>
+              <a:lstStyle/>
+              <a:p>
+                <a:r>
+                  <a:rPr lang="en-US">
+                    <a:noFill/>
+                  </a:rPr>
+                  <a:t> </a:t>
+                </a:r>
+              </a:p>
+            </p:txBody>
+          </p:sp>
+        </mc:Fallback>
+      </mc:AlternateContent>
+      <mc:AlternateContent xmlns:mc="http://schemas.openxmlformats.org/markup-compatibility/2006">
+        <mc:Choice xmlns:a14="http://schemas.microsoft.com/office/drawing/2010/main" Requires="a14">
+          <p:sp>
+            <p:nvSpPr>
+              <p:cNvPr id="35" name="TextBox 34">
+                <a:extLst>
+                  <a:ext uri="{FF2B5EF4-FFF2-40B4-BE49-F238E27FC236}">
+                    <a16:creationId xmlns:a16="http://schemas.microsoft.com/office/drawing/2014/main" id="{228958BB-D62D-0ABA-56CB-266E32958455}"/>
+                  </a:ext>
+                </a:extLst>
+              </p:cNvPr>
+              <p:cNvSpPr txBox="1"/>
+              <p:nvPr/>
+            </p:nvSpPr>
+            <p:spPr>
+              <a:xfrm>
+                <a:off x="2749538" y="3036232"/>
+                <a:ext cx="348172" cy="307777"/>
+              </a:xfrm>
+              <a:prstGeom prst="rect">
+                <a:avLst/>
+              </a:prstGeom>
+              <a:noFill/>
+            </p:spPr>
+            <p:txBody>
+              <a:bodyPr wrap="none" rtlCol="0">
+                <a:spAutoFit/>
+              </a:bodyPr>
+              <a:lstStyle/>
+              <a:p>
+                <a14:m>
+                  <m:oMathPara xmlns:m="http://schemas.openxmlformats.org/officeDocument/2006/math">
+                    <m:oMathParaPr>
+                      <m:jc m:val="centerGroup"/>
+                    </m:oMathParaPr>
+                    <m:oMath xmlns:m="http://schemas.openxmlformats.org/officeDocument/2006/math">
+                      <m:r>
+                        <a:rPr lang="en-US" b="0" i="1" smtClean="0">
+                          <a:latin typeface="Cambria Math" panose="02040503050406030204" pitchFamily="18" charset="0"/>
+                          <a:cs typeface="Calibri" panose="020F0502020204030204" pitchFamily="34" charset="0"/>
+                        </a:rPr>
+                        <m:t>𝐵</m:t>
+                      </m:r>
+                    </m:oMath>
+                  </m:oMathPara>
+                </a14:m>
+                <a:endParaRPr lang="en-US" dirty="0">
+                  <a:latin typeface="Calibri" panose="020F0502020204030204" pitchFamily="34" charset="0"/>
+                  <a:cs typeface="Calibri" panose="020F0502020204030204" pitchFamily="34" charset="0"/>
+                </a:endParaRPr>
+              </a:p>
+            </p:txBody>
+          </p:sp>
+        </mc:Choice>
+        <mc:Fallback>
+          <p:sp>
+            <p:nvSpPr>
+              <p:cNvPr id="35" name="TextBox 34">
+                <a:extLst>
+                  <a:ext uri="{FF2B5EF4-FFF2-40B4-BE49-F238E27FC236}">
+                    <a16:creationId xmlns:a16="http://schemas.microsoft.com/office/drawing/2014/main" id="{228958BB-D62D-0ABA-56CB-266E32958455}"/>
+                  </a:ext>
+                </a:extLst>
+              </p:cNvPr>
+              <p:cNvSpPr txBox="1">
+                <a:spLocks noRot="1" noChangeAspect="1" noMove="1" noResize="1" noEditPoints="1" noAdjustHandles="1" noChangeArrowheads="1" noChangeShapeType="1" noTextEdit="1"/>
+              </p:cNvSpPr>
+              <p:nvPr/>
+            </p:nvSpPr>
+            <p:spPr>
+              <a:xfrm>
+                <a:off x="2749538" y="3036232"/>
+                <a:ext cx="348172" cy="307777"/>
+              </a:xfrm>
+              <a:prstGeom prst="rect">
+                <a:avLst/>
+              </a:prstGeom>
+              <a:blipFill>
+                <a:blip r:embed="rId5"/>
+                <a:stretch>
+                  <a:fillRect/>
+                </a:stretch>
+              </a:blipFill>
+            </p:spPr>
+            <p:txBody>
+              <a:bodyPr/>
+              <a:lstStyle/>
+              <a:p>
+                <a:r>
+                  <a:rPr lang="en-US">
+                    <a:noFill/>
+                  </a:rPr>
+                  <a:t> </a:t>
+                </a:r>
+              </a:p>
+            </p:txBody>
+          </p:sp>
+        </mc:Fallback>
+      </mc:AlternateContent>
+      <p:sp>
+        <p:nvSpPr>
+          <p:cNvPr id="36" name="Rectangle 35">
+            <a:extLst>
+              <a:ext uri="{FF2B5EF4-FFF2-40B4-BE49-F238E27FC236}">
+                <a16:creationId xmlns:a16="http://schemas.microsoft.com/office/drawing/2014/main" id="{34A15BF0-7F36-DFAB-0B08-3F3BDBB670E2}"/>
+              </a:ext>
+            </a:extLst>
+          </p:cNvPr>
+          <p:cNvSpPr/>
+          <p:nvPr/>
+        </p:nvSpPr>
+        <p:spPr>
+          <a:xfrm>
+            <a:off x="4027805" y="2905189"/>
+            <a:ext cx="2281033" cy="1241616"/>
+          </a:xfrm>
+          <a:prstGeom prst="rect">
+            <a:avLst/>
+          </a:prstGeom>
+          <a:noFill/>
+          <a:ln>
+            <a:solidFill>
+              <a:schemeClr val="tx1"/>
+            </a:solidFill>
+          </a:ln>
+        </p:spPr>
+        <p:style>
+          <a:lnRef idx="2">
+            <a:schemeClr val="accent1">
+              <a:shade val="15000"/>
+            </a:schemeClr>
+          </a:lnRef>
+          <a:fillRef idx="1">
+            <a:schemeClr val="accent1"/>
+          </a:fillRef>
+          <a:effectRef idx="0">
+            <a:schemeClr val="accent1"/>
+          </a:effectRef>
+          <a:fontRef idx="minor">
+            <a:schemeClr val="lt1"/>
+          </a:fontRef>
+        </p:style>
+        <p:txBody>
+          <a:bodyPr rtlCol="0" anchor="ctr"/>
+          <a:lstStyle/>
+          <a:p>
+            <a:pPr algn="ctr"/>
+            <a:endParaRPr lang="en-US"/>
+          </a:p>
+        </p:txBody>
+      </p:sp>
+      <p:sp>
+        <p:nvSpPr>
+          <p:cNvPr id="37" name="Oval 36">
+            <a:extLst>
+              <a:ext uri="{FF2B5EF4-FFF2-40B4-BE49-F238E27FC236}">
+                <a16:creationId xmlns:a16="http://schemas.microsoft.com/office/drawing/2014/main" id="{681A80DE-E7EF-7085-35EB-3FB4C4099C33}"/>
+              </a:ext>
+            </a:extLst>
+          </p:cNvPr>
+          <p:cNvSpPr/>
+          <p:nvPr/>
+        </p:nvSpPr>
+        <p:spPr>
+          <a:xfrm>
+            <a:off x="4242749" y="3044650"/>
+            <a:ext cx="1017466" cy="1017466"/>
+          </a:xfrm>
+          <a:prstGeom prst="ellipse">
+            <a:avLst/>
+          </a:prstGeom>
+          <a:noFill/>
+          <a:ln>
+            <a:solidFill>
+              <a:schemeClr val="tx1"/>
+            </a:solidFill>
+          </a:ln>
+        </p:spPr>
+        <p:style>
+          <a:lnRef idx="2">
+            <a:schemeClr val="accent1">
+              <a:shade val="15000"/>
+            </a:schemeClr>
+          </a:lnRef>
+          <a:fillRef idx="1">
+            <a:schemeClr val="accent1"/>
+          </a:fillRef>
+          <a:effectRef idx="0">
+            <a:schemeClr val="accent1"/>
+          </a:effectRef>
+          <a:fontRef idx="minor">
+            <a:schemeClr val="lt1"/>
+          </a:fontRef>
+        </p:style>
+        <p:txBody>
+          <a:bodyPr rtlCol="0" anchor="ctr"/>
+          <a:lstStyle/>
+          <a:p>
+            <a:pPr algn="ctr"/>
+            <a:endParaRPr lang="en-US"/>
+          </a:p>
+        </p:txBody>
+      </p:sp>
+      <p:sp>
+        <p:nvSpPr>
+          <p:cNvPr id="38" name="Oval 37">
+            <a:extLst>
+              <a:ext uri="{FF2B5EF4-FFF2-40B4-BE49-F238E27FC236}">
+                <a16:creationId xmlns:a16="http://schemas.microsoft.com/office/drawing/2014/main" id="{88B9B69F-02E9-C45D-74FF-AB22542142AD}"/>
+              </a:ext>
+            </a:extLst>
+          </p:cNvPr>
+          <p:cNvSpPr/>
+          <p:nvPr/>
+        </p:nvSpPr>
+        <p:spPr>
+          <a:xfrm>
+            <a:off x="5030571" y="3044650"/>
+            <a:ext cx="1017466" cy="1017466"/>
+          </a:xfrm>
+          <a:prstGeom prst="ellipse">
+            <a:avLst/>
+          </a:prstGeom>
+          <a:noFill/>
+          <a:ln>
+            <a:solidFill>
+              <a:schemeClr val="tx1"/>
+            </a:solidFill>
+          </a:ln>
+        </p:spPr>
+        <p:style>
+          <a:lnRef idx="2">
+            <a:schemeClr val="accent1">
+              <a:shade val="15000"/>
+            </a:schemeClr>
+          </a:lnRef>
+          <a:fillRef idx="1">
+            <a:schemeClr val="accent1"/>
+          </a:fillRef>
+          <a:effectRef idx="0">
+            <a:schemeClr val="accent1"/>
+          </a:effectRef>
+          <a:fontRef idx="minor">
+            <a:schemeClr val="lt1"/>
+          </a:fontRef>
+        </p:style>
+        <p:txBody>
+          <a:bodyPr rtlCol="0" anchor="ctr"/>
+          <a:lstStyle/>
+          <a:p>
+            <a:pPr algn="ctr"/>
+            <a:endParaRPr lang="en-US"/>
+          </a:p>
+        </p:txBody>
+      </p:sp>
+      <mc:AlternateContent xmlns:mc="http://schemas.openxmlformats.org/markup-compatibility/2006">
+        <mc:Choice xmlns:a14="http://schemas.microsoft.com/office/drawing/2010/main" Requires="a14">
+          <p:sp>
+            <p:nvSpPr>
+              <p:cNvPr id="39" name="TextBox 38">
+                <a:extLst>
+                  <a:ext uri="{FF2B5EF4-FFF2-40B4-BE49-F238E27FC236}">
+                    <a16:creationId xmlns:a16="http://schemas.microsoft.com/office/drawing/2014/main" id="{D3BAC5BE-0C58-34ED-7047-0A426334EA3F}"/>
+                  </a:ext>
+                </a:extLst>
+              </p:cNvPr>
+              <p:cNvSpPr txBox="1"/>
+              <p:nvPr/>
+            </p:nvSpPr>
+            <p:spPr>
+              <a:xfrm>
+                <a:off x="4567235" y="3034780"/>
+                <a:ext cx="340286" cy="307777"/>
+              </a:xfrm>
+              <a:prstGeom prst="rect">
+                <a:avLst/>
+              </a:prstGeom>
+              <a:noFill/>
+            </p:spPr>
+            <p:txBody>
+              <a:bodyPr wrap="none" rtlCol="0">
+                <a:spAutoFit/>
+              </a:bodyPr>
+              <a:lstStyle/>
+              <a:p>
+                <a14:m>
+                  <m:oMathPara xmlns:m="http://schemas.openxmlformats.org/officeDocument/2006/math">
+                    <m:oMathParaPr>
+                      <m:jc m:val="centerGroup"/>
+                    </m:oMathParaPr>
+                    <m:oMath xmlns:m="http://schemas.openxmlformats.org/officeDocument/2006/math">
+                      <m:r>
+                        <a:rPr lang="en-US" b="0" i="1" smtClean="0">
+                          <a:latin typeface="Cambria Math" panose="02040503050406030204" pitchFamily="18" charset="0"/>
+                          <a:cs typeface="Calibri" panose="020F0502020204030204" pitchFamily="34" charset="0"/>
+                        </a:rPr>
+                        <m:t>𝐴</m:t>
+                      </m:r>
+                    </m:oMath>
+                  </m:oMathPara>
+                </a14:m>
+                <a:endParaRPr lang="en-US" dirty="0">
+                  <a:latin typeface="Calibri" panose="020F0502020204030204" pitchFamily="34" charset="0"/>
+                  <a:cs typeface="Calibri" panose="020F0502020204030204" pitchFamily="34" charset="0"/>
+                </a:endParaRPr>
+              </a:p>
+            </p:txBody>
+          </p:sp>
+        </mc:Choice>
+        <mc:Fallback>
+          <p:sp>
+            <p:nvSpPr>
+              <p:cNvPr id="39" name="TextBox 38">
+                <a:extLst>
+                  <a:ext uri="{FF2B5EF4-FFF2-40B4-BE49-F238E27FC236}">
+                    <a16:creationId xmlns:a16="http://schemas.microsoft.com/office/drawing/2014/main" id="{D3BAC5BE-0C58-34ED-7047-0A426334EA3F}"/>
+                  </a:ext>
+                </a:extLst>
+              </p:cNvPr>
+              <p:cNvSpPr txBox="1">
+                <a:spLocks noRot="1" noChangeAspect="1" noMove="1" noResize="1" noEditPoints="1" noAdjustHandles="1" noChangeArrowheads="1" noChangeShapeType="1" noTextEdit="1"/>
+              </p:cNvSpPr>
+              <p:nvPr/>
+            </p:nvSpPr>
+            <p:spPr>
+              <a:xfrm>
+                <a:off x="4567235" y="3034780"/>
+                <a:ext cx="340286" cy="307777"/>
+              </a:xfrm>
+              <a:prstGeom prst="rect">
+                <a:avLst/>
+              </a:prstGeom>
+              <a:blipFill>
+                <a:blip r:embed="rId6"/>
+                <a:stretch>
+                  <a:fillRect/>
+                </a:stretch>
+              </a:blipFill>
+            </p:spPr>
+            <p:txBody>
+              <a:bodyPr/>
+              <a:lstStyle/>
+              <a:p>
+                <a:r>
+                  <a:rPr lang="en-US">
+                    <a:noFill/>
+                  </a:rPr>
+                  <a:t> </a:t>
+                </a:r>
+              </a:p>
+            </p:txBody>
+          </p:sp>
+        </mc:Fallback>
+      </mc:AlternateContent>
+      <mc:AlternateContent xmlns:mc="http://schemas.openxmlformats.org/markup-compatibility/2006">
+        <mc:Choice xmlns:a14="http://schemas.microsoft.com/office/drawing/2010/main" Requires="a14">
+          <p:sp>
+            <p:nvSpPr>
+              <p:cNvPr id="43" name="TextBox 42">
+                <a:extLst>
+                  <a:ext uri="{FF2B5EF4-FFF2-40B4-BE49-F238E27FC236}">
+                    <a16:creationId xmlns:a16="http://schemas.microsoft.com/office/drawing/2014/main" id="{D660BFF3-4CDE-82CE-2147-F8A9640A1E25}"/>
+                  </a:ext>
+                </a:extLst>
+              </p:cNvPr>
+              <p:cNvSpPr txBox="1"/>
+              <p:nvPr/>
+            </p:nvSpPr>
+            <p:spPr>
+              <a:xfrm>
+                <a:off x="5355057" y="3044650"/>
+                <a:ext cx="348172" cy="307777"/>
+              </a:xfrm>
+              <a:prstGeom prst="rect">
+                <a:avLst/>
+              </a:prstGeom>
+              <a:noFill/>
+            </p:spPr>
+            <p:txBody>
+              <a:bodyPr wrap="none" rtlCol="0">
+                <a:spAutoFit/>
+              </a:bodyPr>
+              <a:lstStyle/>
+              <a:p>
+                <a14:m>
+                  <m:oMathPara xmlns:m="http://schemas.openxmlformats.org/officeDocument/2006/math">
+                    <m:oMathParaPr>
+                      <m:jc m:val="centerGroup"/>
+                    </m:oMathParaPr>
+                    <m:oMath xmlns:m="http://schemas.openxmlformats.org/officeDocument/2006/math">
+                      <m:r>
+                        <a:rPr lang="en-US" b="0" i="1" smtClean="0">
+                          <a:latin typeface="Cambria Math" panose="02040503050406030204" pitchFamily="18" charset="0"/>
+                          <a:cs typeface="Calibri" panose="020F0502020204030204" pitchFamily="34" charset="0"/>
+                        </a:rPr>
+                        <m:t>𝐵</m:t>
+                      </m:r>
+                    </m:oMath>
+                  </m:oMathPara>
+                </a14:m>
+                <a:endParaRPr lang="en-US" dirty="0">
+                  <a:latin typeface="Calibri" panose="020F0502020204030204" pitchFamily="34" charset="0"/>
+                  <a:cs typeface="Calibri" panose="020F0502020204030204" pitchFamily="34" charset="0"/>
+                </a:endParaRPr>
+              </a:p>
+            </p:txBody>
+          </p:sp>
+        </mc:Choice>
+        <mc:Fallback>
+          <p:sp>
+            <p:nvSpPr>
+              <p:cNvPr id="43" name="TextBox 42">
+                <a:extLst>
+                  <a:ext uri="{FF2B5EF4-FFF2-40B4-BE49-F238E27FC236}">
+                    <a16:creationId xmlns:a16="http://schemas.microsoft.com/office/drawing/2014/main" id="{D660BFF3-4CDE-82CE-2147-F8A9640A1E25}"/>
+                  </a:ext>
+                </a:extLst>
+              </p:cNvPr>
+              <p:cNvSpPr txBox="1">
+                <a:spLocks noRot="1" noChangeAspect="1" noMove="1" noResize="1" noEditPoints="1" noAdjustHandles="1" noChangeArrowheads="1" noChangeShapeType="1" noTextEdit="1"/>
+              </p:cNvSpPr>
+              <p:nvPr/>
+            </p:nvSpPr>
+            <p:spPr>
+              <a:xfrm>
+                <a:off x="5355057" y="3044650"/>
+                <a:ext cx="348172" cy="307777"/>
+              </a:xfrm>
+              <a:prstGeom prst="rect">
+                <a:avLst/>
+              </a:prstGeom>
+              <a:blipFill>
+                <a:blip r:embed="rId7"/>
+                <a:stretch>
+                  <a:fillRect/>
+                </a:stretch>
+              </a:blipFill>
+            </p:spPr>
+            <p:txBody>
+              <a:bodyPr/>
+              <a:lstStyle/>
+              <a:p>
+                <a:r>
+                  <a:rPr lang="en-US">
+                    <a:noFill/>
+                  </a:rPr>
+                  <a:t> </a:t>
+                </a:r>
+              </a:p>
+            </p:txBody>
+          </p:sp>
+        </mc:Fallback>
+      </mc:AlternateContent>
+      <mc:AlternateContent xmlns:mc="http://schemas.openxmlformats.org/markup-compatibility/2006">
+        <mc:Choice xmlns:a14="http://schemas.microsoft.com/office/drawing/2010/main" Requires="a14">
+          <p:sp>
+            <p:nvSpPr>
+              <p:cNvPr id="58" name="TextBox 57">
+                <a:extLst>
+                  <a:ext uri="{FF2B5EF4-FFF2-40B4-BE49-F238E27FC236}">
+                    <a16:creationId xmlns:a16="http://schemas.microsoft.com/office/drawing/2014/main" id="{313271BE-7F29-EC8C-52BE-99A43FEDD1A6}"/>
+                  </a:ext>
+                </a:extLst>
+              </p:cNvPr>
+              <p:cNvSpPr txBox="1"/>
+              <p:nvPr/>
+            </p:nvSpPr>
+            <p:spPr>
+              <a:xfrm>
+                <a:off x="4567235" y="1291042"/>
+                <a:ext cx="340286" cy="307777"/>
+              </a:xfrm>
+              <a:prstGeom prst="rect">
+                <a:avLst/>
+              </a:prstGeom>
+              <a:noFill/>
+            </p:spPr>
+            <p:txBody>
+              <a:bodyPr wrap="none" rtlCol="0">
+                <a:spAutoFit/>
+              </a:bodyPr>
+              <a:lstStyle/>
+              <a:p>
+                <a14:m>
+                  <m:oMathPara xmlns:m="http://schemas.openxmlformats.org/officeDocument/2006/math">
+                    <m:oMathParaPr>
+                      <m:jc m:val="centerGroup"/>
+                    </m:oMathParaPr>
+                    <m:oMath xmlns:m="http://schemas.openxmlformats.org/officeDocument/2006/math">
+                      <m:r>
+                        <a:rPr lang="en-US" b="0" i="1" smtClean="0">
+                          <a:latin typeface="Cambria Math" panose="02040503050406030204" pitchFamily="18" charset="0"/>
+                          <a:cs typeface="Calibri" panose="020F0502020204030204" pitchFamily="34" charset="0"/>
+                        </a:rPr>
+                        <m:t>𝐴</m:t>
+                      </m:r>
+                    </m:oMath>
+                  </m:oMathPara>
+                </a14:m>
+                <a:endParaRPr lang="en-US" dirty="0">
+                  <a:latin typeface="Calibri" panose="020F0502020204030204" pitchFamily="34" charset="0"/>
+                  <a:cs typeface="Calibri" panose="020F0502020204030204" pitchFamily="34" charset="0"/>
+                </a:endParaRPr>
+              </a:p>
+            </p:txBody>
+          </p:sp>
+        </mc:Choice>
+        <mc:Fallback>
+          <p:sp>
+            <p:nvSpPr>
+              <p:cNvPr id="58" name="TextBox 57">
+                <a:extLst>
+                  <a:ext uri="{FF2B5EF4-FFF2-40B4-BE49-F238E27FC236}">
+                    <a16:creationId xmlns:a16="http://schemas.microsoft.com/office/drawing/2014/main" id="{313271BE-7F29-EC8C-52BE-99A43FEDD1A6}"/>
+                  </a:ext>
+                </a:extLst>
+              </p:cNvPr>
+              <p:cNvSpPr txBox="1">
+                <a:spLocks noRot="1" noChangeAspect="1" noMove="1" noResize="1" noEditPoints="1" noAdjustHandles="1" noChangeArrowheads="1" noChangeShapeType="1" noTextEdit="1"/>
+              </p:cNvSpPr>
+              <p:nvPr/>
+            </p:nvSpPr>
+            <p:spPr>
+              <a:xfrm>
+                <a:off x="4567235" y="1291042"/>
+                <a:ext cx="340286" cy="307777"/>
+              </a:xfrm>
+              <a:prstGeom prst="rect">
+                <a:avLst/>
+              </a:prstGeom>
+              <a:blipFill>
+                <a:blip r:embed="rId8"/>
+                <a:stretch>
+                  <a:fillRect/>
+                </a:stretch>
+              </a:blipFill>
+            </p:spPr>
+            <p:txBody>
+              <a:bodyPr/>
+              <a:lstStyle/>
+              <a:p>
+                <a:r>
+                  <a:rPr lang="en-US">
+                    <a:noFill/>
+                  </a:rPr>
+                  <a:t> </a:t>
+                </a:r>
+              </a:p>
+            </p:txBody>
+          </p:sp>
+        </mc:Fallback>
+      </mc:AlternateContent>
+      <mc:AlternateContent xmlns:mc="http://schemas.openxmlformats.org/markup-compatibility/2006">
+        <mc:Choice xmlns:a14="http://schemas.microsoft.com/office/drawing/2010/main" Requires="a14">
+          <p:sp>
+            <p:nvSpPr>
+              <p:cNvPr id="59" name="TextBox 58">
+                <a:extLst>
+                  <a:ext uri="{FF2B5EF4-FFF2-40B4-BE49-F238E27FC236}">
+                    <a16:creationId xmlns:a16="http://schemas.microsoft.com/office/drawing/2014/main" id="{BD0C0DDC-F181-90DA-E905-7669F36F176A}"/>
+                  </a:ext>
+                </a:extLst>
+              </p:cNvPr>
+              <p:cNvSpPr txBox="1"/>
+              <p:nvPr/>
+            </p:nvSpPr>
+            <p:spPr>
+              <a:xfrm>
+                <a:off x="5355057" y="1300912"/>
+                <a:ext cx="348172" cy="307777"/>
+              </a:xfrm>
+              <a:prstGeom prst="rect">
+                <a:avLst/>
+              </a:prstGeom>
+              <a:noFill/>
+            </p:spPr>
+            <p:txBody>
+              <a:bodyPr wrap="none" rtlCol="0">
+                <a:spAutoFit/>
+              </a:bodyPr>
+              <a:lstStyle/>
+              <a:p>
+                <a14:m>
+                  <m:oMathPara xmlns:m="http://schemas.openxmlformats.org/officeDocument/2006/math">
+                    <m:oMathParaPr>
+                      <m:jc m:val="centerGroup"/>
+                    </m:oMathParaPr>
+                    <m:oMath xmlns:m="http://schemas.openxmlformats.org/officeDocument/2006/math">
+                      <m:r>
+                        <a:rPr lang="en-US" b="0" i="1" smtClean="0">
+                          <a:latin typeface="Cambria Math" panose="02040503050406030204" pitchFamily="18" charset="0"/>
+                          <a:cs typeface="Calibri" panose="020F0502020204030204" pitchFamily="34" charset="0"/>
+                        </a:rPr>
+                        <m:t>𝐵</m:t>
+                      </m:r>
+                    </m:oMath>
+                  </m:oMathPara>
+                </a14:m>
+                <a:endParaRPr lang="en-US" dirty="0">
+                  <a:latin typeface="Calibri" panose="020F0502020204030204" pitchFamily="34" charset="0"/>
+                  <a:cs typeface="Calibri" panose="020F0502020204030204" pitchFamily="34" charset="0"/>
+                </a:endParaRPr>
+              </a:p>
+            </p:txBody>
+          </p:sp>
+        </mc:Choice>
+        <mc:Fallback>
+          <p:sp>
+            <p:nvSpPr>
+              <p:cNvPr id="59" name="TextBox 58">
+                <a:extLst>
+                  <a:ext uri="{FF2B5EF4-FFF2-40B4-BE49-F238E27FC236}">
+                    <a16:creationId xmlns:a16="http://schemas.microsoft.com/office/drawing/2014/main" id="{BD0C0DDC-F181-90DA-E905-7669F36F176A}"/>
+                  </a:ext>
+                </a:extLst>
+              </p:cNvPr>
+              <p:cNvSpPr txBox="1">
+                <a:spLocks noRot="1" noChangeAspect="1" noMove="1" noResize="1" noEditPoints="1" noAdjustHandles="1" noChangeArrowheads="1" noChangeShapeType="1" noTextEdit="1"/>
+              </p:cNvSpPr>
+              <p:nvPr/>
+            </p:nvSpPr>
+            <p:spPr>
+              <a:xfrm>
+                <a:off x="5355057" y="1300912"/>
+                <a:ext cx="348172" cy="307777"/>
+              </a:xfrm>
+              <a:prstGeom prst="rect">
+                <a:avLst/>
+              </a:prstGeom>
+              <a:blipFill>
+                <a:blip r:embed="rId9"/>
+                <a:stretch>
+                  <a:fillRect/>
+                </a:stretch>
+              </a:blipFill>
+            </p:spPr>
+            <p:txBody>
+              <a:bodyPr/>
+              <a:lstStyle/>
+              <a:p>
+                <a:r>
+                  <a:rPr lang="en-US">
+                    <a:noFill/>
+                  </a:rPr>
+                  <a:t> </a:t>
+                </a:r>
+              </a:p>
+            </p:txBody>
+          </p:sp>
+        </mc:Fallback>
+      </mc:AlternateContent>
+      <mc:AlternateContent xmlns:mc="http://schemas.openxmlformats.org/markup-compatibility/2006">
+        <mc:Choice xmlns:a14="http://schemas.microsoft.com/office/drawing/2010/main" Requires="a14">
+          <p:sp>
+            <p:nvSpPr>
+              <p:cNvPr id="66" name="TextBox 65">
+                <a:extLst>
+                  <a:ext uri="{FF2B5EF4-FFF2-40B4-BE49-F238E27FC236}">
+                    <a16:creationId xmlns:a16="http://schemas.microsoft.com/office/drawing/2014/main" id="{F06DA49F-4A11-F98D-B749-71B1B3AA8098}"/>
+                  </a:ext>
+                </a:extLst>
+              </p:cNvPr>
+              <p:cNvSpPr txBox="1"/>
+              <p:nvPr/>
+            </p:nvSpPr>
+            <p:spPr>
+              <a:xfrm>
+                <a:off x="4836274" y="2421271"/>
+                <a:ext cx="664093" cy="307777"/>
+              </a:xfrm>
+              <a:prstGeom prst="rect">
+                <a:avLst/>
+              </a:prstGeom>
+              <a:noFill/>
+            </p:spPr>
+            <p:txBody>
+              <a:bodyPr wrap="none" rtlCol="0">
+                <a:spAutoFit/>
+              </a:bodyPr>
+              <a:lstStyle/>
+              <a:p>
+                <a14:m>
+                  <m:oMathPara xmlns:m="http://schemas.openxmlformats.org/officeDocument/2006/math">
+                    <m:oMathParaPr>
+                      <m:jc m:val="centerGroup"/>
+                    </m:oMathParaPr>
+                    <m:oMath xmlns:m="http://schemas.openxmlformats.org/officeDocument/2006/math">
+                      <m:r>
+                        <m:rPr>
+                          <m:sty m:val="p"/>
+                        </m:rPr>
+                        <a:rPr lang="en-US" b="0" i="0" smtClean="0">
+                          <a:latin typeface="Cambria Math" panose="02040503050406030204" pitchFamily="18" charset="0"/>
+                          <a:cs typeface="Calibri" panose="020F0502020204030204" pitchFamily="34" charset="0"/>
+                        </a:rPr>
+                        <m:t>Pr</m:t>
+                      </m:r>
+                      <m:r>
+                        <a:rPr lang="en-US" b="0" i="1" smtClean="0">
+                          <a:latin typeface="Cambria Math" panose="02040503050406030204" pitchFamily="18" charset="0"/>
+                          <a:cs typeface="Calibri" panose="020F0502020204030204" pitchFamily="34" charset="0"/>
+                        </a:rPr>
+                        <m:t>⁡(</m:t>
+                      </m:r>
+                      <m:r>
+                        <a:rPr lang="en-US" b="0" i="1" smtClean="0">
+                          <a:latin typeface="Cambria Math" panose="02040503050406030204" pitchFamily="18" charset="0"/>
+                          <a:cs typeface="Calibri" panose="020F0502020204030204" pitchFamily="34" charset="0"/>
+                        </a:rPr>
+                        <m:t>𝐴</m:t>
+                      </m:r>
+                      <m:r>
+                        <a:rPr lang="en-US" b="0" i="1" smtClean="0">
+                          <a:latin typeface="Cambria Math" panose="02040503050406030204" pitchFamily="18" charset="0"/>
+                          <a:cs typeface="Calibri" panose="020F0502020204030204" pitchFamily="34" charset="0"/>
+                        </a:rPr>
+                        <m:t>)</m:t>
+                      </m:r>
+                    </m:oMath>
+                  </m:oMathPara>
+                </a14:m>
+                <a:endParaRPr lang="en-US" dirty="0">
+                  <a:latin typeface="Calibri" panose="020F0502020204030204" pitchFamily="34" charset="0"/>
+                  <a:cs typeface="Calibri" panose="020F0502020204030204" pitchFamily="34" charset="0"/>
+                </a:endParaRPr>
+              </a:p>
+            </p:txBody>
+          </p:sp>
+        </mc:Choice>
+        <mc:Fallback>
+          <p:sp>
+            <p:nvSpPr>
+              <p:cNvPr id="66" name="TextBox 65">
+                <a:extLst>
+                  <a:ext uri="{FF2B5EF4-FFF2-40B4-BE49-F238E27FC236}">
+                    <a16:creationId xmlns:a16="http://schemas.microsoft.com/office/drawing/2014/main" id="{F06DA49F-4A11-F98D-B749-71B1B3AA8098}"/>
+                  </a:ext>
+                </a:extLst>
+              </p:cNvPr>
+              <p:cNvSpPr txBox="1">
+                <a:spLocks noRot="1" noChangeAspect="1" noMove="1" noResize="1" noEditPoints="1" noAdjustHandles="1" noChangeArrowheads="1" noChangeShapeType="1" noTextEdit="1"/>
+              </p:cNvSpPr>
+              <p:nvPr/>
+            </p:nvSpPr>
+            <p:spPr>
+              <a:xfrm>
+                <a:off x="4836274" y="2421271"/>
+                <a:ext cx="664093" cy="307777"/>
+              </a:xfrm>
+              <a:prstGeom prst="rect">
+                <a:avLst/>
+              </a:prstGeom>
+              <a:blipFill>
+                <a:blip r:embed="rId10"/>
+                <a:stretch>
+                  <a:fillRect b="-7692"/>
+                </a:stretch>
+              </a:blipFill>
+            </p:spPr>
+            <p:txBody>
+              <a:bodyPr/>
+              <a:lstStyle/>
+              <a:p>
+                <a:r>
+                  <a:rPr lang="en-US">
+                    <a:noFill/>
+                  </a:rPr>
+                  <a:t> </a:t>
+                </a:r>
+              </a:p>
+            </p:txBody>
+          </p:sp>
+        </mc:Fallback>
+      </mc:AlternateContent>
+      <mc:AlternateContent xmlns:mc="http://schemas.openxmlformats.org/markup-compatibility/2006">
+        <mc:Choice xmlns:a14="http://schemas.microsoft.com/office/drawing/2010/main" Requires="a14">
+          <p:sp>
+            <p:nvSpPr>
+              <p:cNvPr id="67" name="TextBox 66">
+                <a:extLst>
+                  <a:ext uri="{FF2B5EF4-FFF2-40B4-BE49-F238E27FC236}">
+                    <a16:creationId xmlns:a16="http://schemas.microsoft.com/office/drawing/2014/main" id="{79D8D2EF-E1D0-05E4-9F15-6E136B24067A}"/>
+                  </a:ext>
+                </a:extLst>
+              </p:cNvPr>
+              <p:cNvSpPr txBox="1"/>
+              <p:nvPr/>
+            </p:nvSpPr>
+            <p:spPr>
+              <a:xfrm>
+                <a:off x="2068243" y="4146805"/>
+                <a:ext cx="989117" cy="307777"/>
+              </a:xfrm>
+              <a:prstGeom prst="rect">
+                <a:avLst/>
+              </a:prstGeom>
+              <a:noFill/>
+            </p:spPr>
+            <p:txBody>
+              <a:bodyPr wrap="none" rtlCol="0">
+                <a:spAutoFit/>
+              </a:bodyPr>
+              <a:lstStyle/>
+              <a:p>
+                <a14:m>
+                  <m:oMathPara xmlns:m="http://schemas.openxmlformats.org/officeDocument/2006/math">
+                    <m:oMathParaPr>
+                      <m:jc m:val="centerGroup"/>
+                    </m:oMathParaPr>
+                    <m:oMath xmlns:m="http://schemas.openxmlformats.org/officeDocument/2006/math">
+                      <m:r>
+                        <m:rPr>
+                          <m:sty m:val="p"/>
+                        </m:rPr>
+                        <a:rPr lang="en-US" b="0" i="0" smtClean="0">
+                          <a:latin typeface="Cambria Math" panose="02040503050406030204" pitchFamily="18" charset="0"/>
+                          <a:cs typeface="Calibri" panose="020F0502020204030204" pitchFamily="34" charset="0"/>
+                        </a:rPr>
+                        <m:t>Pr</m:t>
+                      </m:r>
+                      <m:r>
+                        <a:rPr lang="en-US" b="0" i="1" smtClean="0">
+                          <a:latin typeface="Cambria Math" panose="02040503050406030204" pitchFamily="18" charset="0"/>
+                          <a:cs typeface="Calibri" panose="020F0502020204030204" pitchFamily="34" charset="0"/>
+                        </a:rPr>
+                        <m:t>⁡(</m:t>
+                      </m:r>
+                      <m:r>
+                        <a:rPr lang="en-US" b="0" i="1" smtClean="0">
+                          <a:latin typeface="Cambria Math" panose="02040503050406030204" pitchFamily="18" charset="0"/>
+                          <a:cs typeface="Calibri" panose="020F0502020204030204" pitchFamily="34" charset="0"/>
+                        </a:rPr>
+                        <m:t>𝐴</m:t>
+                      </m:r>
+                      <m:r>
+                        <a:rPr lang="en-US" b="0" i="1" smtClean="0">
+                          <a:latin typeface="Cambria Math" panose="02040503050406030204" pitchFamily="18" charset="0"/>
+                          <a:cs typeface="Calibri" panose="020F0502020204030204" pitchFamily="34" charset="0"/>
+                        </a:rPr>
+                        <m:t>∪</m:t>
+                      </m:r>
+                      <m:r>
+                        <a:rPr lang="en-US" b="0" i="1" smtClean="0">
+                          <a:latin typeface="Cambria Math" panose="02040503050406030204" pitchFamily="18" charset="0"/>
+                          <a:cs typeface="Calibri" panose="020F0502020204030204" pitchFamily="34" charset="0"/>
+                        </a:rPr>
+                        <m:t>𝐵</m:t>
+                      </m:r>
+                      <m:r>
+                        <a:rPr lang="en-US" b="0" i="1" smtClean="0">
+                          <a:latin typeface="Cambria Math" panose="02040503050406030204" pitchFamily="18" charset="0"/>
+                          <a:cs typeface="Calibri" panose="020F0502020204030204" pitchFamily="34" charset="0"/>
+                        </a:rPr>
+                        <m:t>)</m:t>
+                      </m:r>
+                    </m:oMath>
+                  </m:oMathPara>
+                </a14:m>
+                <a:endParaRPr lang="en-US" dirty="0">
+                  <a:latin typeface="Calibri" panose="020F0502020204030204" pitchFamily="34" charset="0"/>
+                  <a:cs typeface="Calibri" panose="020F0502020204030204" pitchFamily="34" charset="0"/>
+                </a:endParaRPr>
+              </a:p>
+            </p:txBody>
+          </p:sp>
+        </mc:Choice>
+        <mc:Fallback>
+          <p:sp>
+            <p:nvSpPr>
+              <p:cNvPr id="67" name="TextBox 66">
+                <a:extLst>
+                  <a:ext uri="{FF2B5EF4-FFF2-40B4-BE49-F238E27FC236}">
+                    <a16:creationId xmlns:a16="http://schemas.microsoft.com/office/drawing/2014/main" id="{79D8D2EF-E1D0-05E4-9F15-6E136B24067A}"/>
+                  </a:ext>
+                </a:extLst>
+              </p:cNvPr>
+              <p:cNvSpPr txBox="1">
+                <a:spLocks noRot="1" noChangeAspect="1" noMove="1" noResize="1" noEditPoints="1" noAdjustHandles="1" noChangeArrowheads="1" noChangeShapeType="1" noTextEdit="1"/>
+              </p:cNvSpPr>
+              <p:nvPr/>
+            </p:nvSpPr>
+            <p:spPr>
+              <a:xfrm>
+                <a:off x="2068243" y="4146805"/>
+                <a:ext cx="989117" cy="307777"/>
+              </a:xfrm>
+              <a:prstGeom prst="rect">
+                <a:avLst/>
+              </a:prstGeom>
+              <a:blipFill>
+                <a:blip r:embed="rId11"/>
+                <a:stretch>
+                  <a:fillRect b="-12000"/>
+                </a:stretch>
+              </a:blipFill>
+            </p:spPr>
+            <p:txBody>
+              <a:bodyPr/>
+              <a:lstStyle/>
+              <a:p>
+                <a:r>
+                  <a:rPr lang="en-US">
+                    <a:noFill/>
+                  </a:rPr>
+                  <a:t> </a:t>
+                </a:r>
+              </a:p>
+            </p:txBody>
+          </p:sp>
+        </mc:Fallback>
+      </mc:AlternateContent>
+      <mc:AlternateContent xmlns:mc="http://schemas.openxmlformats.org/markup-compatibility/2006">
+        <mc:Choice xmlns:a14="http://schemas.microsoft.com/office/drawing/2010/main" Requires="a14">
+          <p:sp>
+            <p:nvSpPr>
+              <p:cNvPr id="68" name="TextBox 67">
+                <a:extLst>
+                  <a:ext uri="{FF2B5EF4-FFF2-40B4-BE49-F238E27FC236}">
+                    <a16:creationId xmlns:a16="http://schemas.microsoft.com/office/drawing/2014/main" id="{02A8B3B3-6EB3-EBAB-8C49-F2BD06C71518}"/>
+                  </a:ext>
+                </a:extLst>
+              </p:cNvPr>
+              <p:cNvSpPr txBox="1"/>
+              <p:nvPr/>
+            </p:nvSpPr>
+            <p:spPr>
+              <a:xfrm>
+                <a:off x="4673761" y="4154902"/>
+                <a:ext cx="989117" cy="307777"/>
+              </a:xfrm>
+              <a:prstGeom prst="rect">
+                <a:avLst/>
+              </a:prstGeom>
+              <a:noFill/>
+            </p:spPr>
+            <p:txBody>
+              <a:bodyPr wrap="none" rtlCol="0">
+                <a:spAutoFit/>
+              </a:bodyPr>
+              <a:lstStyle/>
+              <a:p>
+                <a14:m>
+                  <m:oMathPara xmlns:m="http://schemas.openxmlformats.org/officeDocument/2006/math">
+                    <m:oMathParaPr>
+                      <m:jc m:val="centerGroup"/>
+                    </m:oMathParaPr>
+                    <m:oMath xmlns:m="http://schemas.openxmlformats.org/officeDocument/2006/math">
+                      <m:r>
+                        <m:rPr>
+                          <m:sty m:val="p"/>
+                        </m:rPr>
+                        <a:rPr lang="en-US" b="0" i="0" smtClean="0">
+                          <a:latin typeface="Cambria Math" panose="02040503050406030204" pitchFamily="18" charset="0"/>
+                          <a:cs typeface="Calibri" panose="020F0502020204030204" pitchFamily="34" charset="0"/>
+                        </a:rPr>
+                        <m:t>Pr</m:t>
+                      </m:r>
+                      <m:r>
+                        <a:rPr lang="en-US" b="0" i="1" smtClean="0">
+                          <a:latin typeface="Cambria Math" panose="02040503050406030204" pitchFamily="18" charset="0"/>
+                          <a:cs typeface="Calibri" panose="020F0502020204030204" pitchFamily="34" charset="0"/>
+                        </a:rPr>
+                        <m:t>⁡(</m:t>
+                      </m:r>
+                      <m:r>
+                        <a:rPr lang="en-US" b="0" i="1" smtClean="0">
+                          <a:latin typeface="Cambria Math" panose="02040503050406030204" pitchFamily="18" charset="0"/>
+                          <a:cs typeface="Calibri" panose="020F0502020204030204" pitchFamily="34" charset="0"/>
+                        </a:rPr>
+                        <m:t>𝐴</m:t>
+                      </m:r>
+                      <m:r>
+                        <a:rPr lang="en-US" b="0" i="1" smtClean="0">
+                          <a:latin typeface="Cambria Math" panose="02040503050406030204" pitchFamily="18" charset="0"/>
+                          <a:cs typeface="Calibri" panose="020F0502020204030204" pitchFamily="34" charset="0"/>
+                        </a:rPr>
+                        <m:t>∩</m:t>
+                      </m:r>
+                      <m:r>
+                        <a:rPr lang="en-US" b="0" i="1" smtClean="0">
+                          <a:latin typeface="Cambria Math" panose="02040503050406030204" pitchFamily="18" charset="0"/>
+                          <a:cs typeface="Calibri" panose="020F0502020204030204" pitchFamily="34" charset="0"/>
+                        </a:rPr>
+                        <m:t>𝐵</m:t>
+                      </m:r>
+                      <m:r>
+                        <a:rPr lang="en-US" b="0" i="1" smtClean="0">
+                          <a:latin typeface="Cambria Math" panose="02040503050406030204" pitchFamily="18" charset="0"/>
+                          <a:cs typeface="Calibri" panose="020F0502020204030204" pitchFamily="34" charset="0"/>
+                        </a:rPr>
+                        <m:t>)</m:t>
+                      </m:r>
+                    </m:oMath>
+                  </m:oMathPara>
+                </a14:m>
+                <a:endParaRPr lang="en-US" dirty="0">
+                  <a:latin typeface="Calibri" panose="020F0502020204030204" pitchFamily="34" charset="0"/>
+                  <a:cs typeface="Calibri" panose="020F0502020204030204" pitchFamily="34" charset="0"/>
+                </a:endParaRPr>
+              </a:p>
+            </p:txBody>
+          </p:sp>
+        </mc:Choice>
+        <mc:Fallback>
+          <p:sp>
+            <p:nvSpPr>
+              <p:cNvPr id="68" name="TextBox 67">
+                <a:extLst>
+                  <a:ext uri="{FF2B5EF4-FFF2-40B4-BE49-F238E27FC236}">
+                    <a16:creationId xmlns:a16="http://schemas.microsoft.com/office/drawing/2014/main" id="{02A8B3B3-6EB3-EBAB-8C49-F2BD06C71518}"/>
+                  </a:ext>
+                </a:extLst>
+              </p:cNvPr>
+              <p:cNvSpPr txBox="1">
+                <a:spLocks noRot="1" noChangeAspect="1" noMove="1" noResize="1" noEditPoints="1" noAdjustHandles="1" noChangeArrowheads="1" noChangeShapeType="1" noTextEdit="1"/>
+              </p:cNvSpPr>
+              <p:nvPr/>
+            </p:nvSpPr>
+            <p:spPr>
+              <a:xfrm>
+                <a:off x="4673761" y="4154902"/>
+                <a:ext cx="989117" cy="307777"/>
+              </a:xfrm>
+              <a:prstGeom prst="rect">
+                <a:avLst/>
+              </a:prstGeom>
+              <a:blipFill>
+                <a:blip r:embed="rId12"/>
+                <a:stretch>
+                  <a:fillRect b="-12000"/>
+                </a:stretch>
+              </a:blipFill>
+            </p:spPr>
+            <p:txBody>
+              <a:bodyPr/>
+              <a:lstStyle/>
+              <a:p>
+                <a:r>
+                  <a:rPr lang="en-US">
+                    <a:noFill/>
+                  </a:rPr>
+                  <a:t> </a:t>
+                </a:r>
+              </a:p>
+            </p:txBody>
+          </p:sp>
+        </mc:Fallback>
+      </mc:AlternateContent>
+    </p:spTree>
+    <p:extLst>
+      <p:ext uri="{BB962C8B-B14F-4D97-AF65-F5344CB8AC3E}">
+        <p14:creationId xmlns:p14="http://schemas.microsoft.com/office/powerpoint/2010/main" val="511849864"/>
       </p:ext>
     </p:extLst>
   </p:cSld>

</xml_diff>